<commit_message>
subiendo cambios de diseño de formularios
</commit_message>
<xml_diff>
--- a/CRUD VBA.pptx
+++ b/CRUD VBA.pptx
@@ -5,7 +5,7 @@
     <p:sldMasterId id="2147483648" r:id="rId1"/>
   </p:sldMasterIdLst>
   <p:handoutMasterIdLst>
-    <p:handoutMasterId r:id="rId21"/>
+    <p:handoutMasterId r:id="rId22"/>
   </p:handoutMasterIdLst>
   <p:sldIdLst>
     <p:sldId id="256" r:id="rId2"/>
@@ -27,6 +27,7 @@
     <p:sldId id="459" r:id="rId18"/>
     <p:sldId id="467" r:id="rId19"/>
     <p:sldId id="460" r:id="rId20"/>
+    <p:sldId id="468" r:id="rId21"/>
   </p:sldIdLst>
   <p:sldSz cx="12192000" cy="6858000"/>
   <p:notesSz cx="6858000" cy="9144000"/>
@@ -7725,6 +7726,188 @@
     <p:extLst>
       <p:ext uri="{BB962C8B-B14F-4D97-AF65-F5344CB8AC3E}">
         <p14:creationId xmlns:p14="http://schemas.microsoft.com/office/powerpoint/2010/main" val="2555701833"/>
+      </p:ext>
+    </p:extLst>
+  </p:cSld>
+  <p:clrMapOvr>
+    <a:masterClrMapping/>
+  </p:clrMapOvr>
+</p:sld>
+</file>
+
+<file path=ppt/slides/slide20.xml><?xml version="1.0" encoding="utf-8"?>
+<p:sld xmlns:a="http://schemas.openxmlformats.org/drawingml/2006/main" xmlns:r="http://schemas.openxmlformats.org/officeDocument/2006/relationships" xmlns:p="http://schemas.openxmlformats.org/presentationml/2006/main">
+  <p:cSld>
+    <p:spTree>
+      <p:nvGrpSpPr>
+        <p:cNvPr id="1" name=""/>
+        <p:cNvGrpSpPr/>
+        <p:nvPr/>
+      </p:nvGrpSpPr>
+      <p:grpSpPr>
+        <a:xfrm>
+          <a:off x="0" y="0"/>
+          <a:ext cx="0" cy="0"/>
+          <a:chOff x="0" y="0"/>
+          <a:chExt cx="0" cy="0"/>
+        </a:xfrm>
+      </p:grpSpPr>
+      <p:sp>
+        <p:nvSpPr>
+          <p:cNvPr id="2" name="Título 1">
+            <a:extLst>
+              <a:ext uri="{FF2B5EF4-FFF2-40B4-BE49-F238E27FC236}">
+                <a16:creationId xmlns:a16="http://schemas.microsoft.com/office/drawing/2014/main" id="{511DB7DD-FA39-4655-9669-C74938183013}"/>
+              </a:ext>
+            </a:extLst>
+          </p:cNvPr>
+          <p:cNvSpPr>
+            <a:spLocks noGrp="1"/>
+          </p:cNvSpPr>
+          <p:nvPr>
+            <p:ph type="title"/>
+          </p:nvPr>
+        </p:nvSpPr>
+        <p:spPr/>
+        <p:txBody>
+          <a:bodyPr/>
+          <a:lstStyle/>
+          <a:p>
+            <a:r>
+              <a:rPr lang="es-PE" b="1" dirty="0"/>
+              <a:t>RECORDSET</a:t>
+            </a:r>
+          </a:p>
+        </p:txBody>
+      </p:sp>
+      <p:sp>
+        <p:nvSpPr>
+          <p:cNvPr id="3" name="Marcador de contenido 2">
+            <a:extLst>
+              <a:ext uri="{FF2B5EF4-FFF2-40B4-BE49-F238E27FC236}">
+                <a16:creationId xmlns:a16="http://schemas.microsoft.com/office/drawing/2014/main" id="{5C5B792B-A2E1-4098-9DD7-F2C6456A5300}"/>
+              </a:ext>
+            </a:extLst>
+          </p:cNvPr>
+          <p:cNvSpPr>
+            <a:spLocks noGrp="1"/>
+          </p:cNvSpPr>
+          <p:nvPr>
+            <p:ph idx="1"/>
+          </p:nvPr>
+        </p:nvSpPr>
+        <p:spPr>
+          <a:xfrm>
+            <a:off x="1243366" y="1786483"/>
+            <a:ext cx="10110433" cy="2654888"/>
+          </a:xfrm>
+        </p:spPr>
+        <p:txBody>
+          <a:bodyPr>
+            <a:normAutofit/>
+          </a:bodyPr>
+          <a:lstStyle/>
+          <a:p>
+            <a:pPr algn="just"/>
+            <a:r>
+              <a:rPr lang="es-PE" dirty="0"/>
+              <a:t>Es una estructura de datos usada en programación cuya utilidad es la de almacenar información desde una tabla de una base de datos.</a:t>
+            </a:r>
+            <a:endParaRPr lang="es-PE" dirty="0">
+              <a:solidFill>
+                <a:schemeClr val="tx1"/>
+              </a:solidFill>
+            </a:endParaRPr>
+          </a:p>
+        </p:txBody>
+      </p:sp>
+      <p:pic>
+        <p:nvPicPr>
+          <p:cNvPr id="14" name="Imagen 13">
+            <a:extLst>
+              <a:ext uri="{FF2B5EF4-FFF2-40B4-BE49-F238E27FC236}">
+                <a16:creationId xmlns:a16="http://schemas.microsoft.com/office/drawing/2014/main" id="{A531E5F3-0F8F-4BD9-85AD-D307327E0CBF}"/>
+              </a:ext>
+            </a:extLst>
+          </p:cNvPr>
+          <p:cNvPicPr>
+            <a:picLocks noChangeAspect="1"/>
+          </p:cNvPicPr>
+          <p:nvPr/>
+        </p:nvPicPr>
+        <p:blipFill>
+          <a:blip r:embed="rId2">
+            <a:extLst>
+              <a:ext uri="{28A0092B-C50C-407E-A947-70E740481C1C}">
+                <a14:useLocalDpi xmlns:a14="http://schemas.microsoft.com/office/drawing/2010/main" val="0"/>
+              </a:ext>
+            </a:extLst>
+          </a:blip>
+          <a:stretch>
+            <a:fillRect/>
+          </a:stretch>
+        </p:blipFill>
+        <p:spPr>
+          <a:xfrm>
+            <a:off x="9276213" y="3324734"/>
+            <a:ext cx="2233274" cy="2233274"/>
+          </a:xfrm>
+          <a:prstGeom prst="rect">
+            <a:avLst/>
+          </a:prstGeom>
+        </p:spPr>
+      </p:pic>
+      <p:pic>
+        <p:nvPicPr>
+          <p:cNvPr id="1026" name="Picture 2" descr="P of EAA: Record Set">
+            <a:extLst>
+              <a:ext uri="{FF2B5EF4-FFF2-40B4-BE49-F238E27FC236}">
+                <a16:creationId xmlns:a16="http://schemas.microsoft.com/office/drawing/2014/main" id="{CABCE87F-C45D-4B43-B873-D80429CBAF21}"/>
+              </a:ext>
+            </a:extLst>
+          </p:cNvPr>
+          <p:cNvPicPr>
+            <a:picLocks noChangeAspect="1" noChangeArrowheads="1"/>
+          </p:cNvPicPr>
+          <p:nvPr/>
+        </p:nvPicPr>
+        <p:blipFill>
+          <a:blip r:embed="rId3">
+            <a:extLst>
+              <a:ext uri="{28A0092B-C50C-407E-A947-70E740481C1C}">
+                <a14:useLocalDpi xmlns:a14="http://schemas.microsoft.com/office/drawing/2010/main" val="0"/>
+              </a:ext>
+            </a:extLst>
+          </a:blip>
+          <a:srcRect/>
+          <a:stretch>
+            <a:fillRect/>
+          </a:stretch>
+        </p:blipFill>
+        <p:spPr bwMode="auto">
+          <a:xfrm>
+            <a:off x="1243366" y="3548419"/>
+            <a:ext cx="6616163" cy="2412775"/>
+          </a:xfrm>
+          <a:prstGeom prst="rect">
+            <a:avLst/>
+          </a:prstGeom>
+          <a:noFill/>
+          <a:extLst>
+            <a:ext uri="{909E8E84-426E-40DD-AFC4-6F175D3DCCD1}">
+              <a14:hiddenFill xmlns:a14="http://schemas.microsoft.com/office/drawing/2010/main">
+                <a:solidFill>
+                  <a:srgbClr val="FFFFFF"/>
+                </a:solidFill>
+              </a14:hiddenFill>
+            </a:ext>
+          </a:extLst>
+        </p:spPr>
+      </p:pic>
+    </p:spTree>
+    <p:extLst>
+      <p:ext uri="{BB962C8B-B14F-4D97-AF65-F5344CB8AC3E}">
+        <p14:creationId xmlns:p14="http://schemas.microsoft.com/office/powerpoint/2010/main" val="3517554191"/>
       </p:ext>
     </p:extLst>
   </p:cSld>

</xml_diff>